<commit_message>
CVS ist nicht das einzige VCS
</commit_message>
<xml_diff>
--- a/org.faktorips.doc/schulung/anwendungsentwicklung2/FaktorIPS-Schulung 3-C - Modellierung Produktseite.pptx
+++ b/org.faktorips.doc/schulung/anwendungsentwicklung2/FaktorIPS-Schulung 3-C - Modellierung Produktseite.pptx
@@ -218,6 +218,59 @@
         </p14:section>
       </p14:sectionLst>
     </p:ext>
+    <p:ext uri="{EFAFB233-063F-42B5-8137-9DF3F51BA10A}">
+      <p15:sldGuideLst xmlns:p15="http://schemas.microsoft.com/office/powerpoint/2012/main">
+        <p15:guide id="1" orient="horz" pos="2160">
+          <p15:clr>
+            <a:srgbClr val="A4A3A4"/>
+          </p15:clr>
+        </p15:guide>
+        <p15:guide id="2" orient="horz" pos="3317">
+          <p15:clr>
+            <a:srgbClr val="A4A3A4"/>
+          </p15:clr>
+        </p15:guide>
+        <p15:guide id="3" orient="horz" pos="2478">
+          <p15:clr>
+            <a:srgbClr val="A4A3A4"/>
+          </p15:clr>
+        </p15:guide>
+        <p15:guide id="4" orient="horz" pos="822">
+          <p15:clr>
+            <a:srgbClr val="A4A3A4"/>
+          </p15:clr>
+        </p15:guide>
+        <p15:guide id="5" orient="horz" pos="3498">
+          <p15:clr>
+            <a:srgbClr val="A4A3A4"/>
+          </p15:clr>
+        </p15:guide>
+        <p15:guide id="6" pos="3356">
+          <p15:clr>
+            <a:srgbClr val="A4A3A4"/>
+          </p15:clr>
+        </p15:guide>
+        <p15:guide id="7" pos="158">
+          <p15:clr>
+            <a:srgbClr val="A4A3A4"/>
+          </p15:clr>
+        </p15:guide>
+      </p15:sldGuideLst>
+    </p:ext>
+    <p:ext uri="{2D200454-40CA-4A62-9FC3-DE9A4176ACB9}">
+      <p15:notesGuideLst xmlns:p15="http://schemas.microsoft.com/office/powerpoint/2012/main">
+        <p15:guide id="1" orient="horz" pos="3104">
+          <p15:clr>
+            <a:srgbClr val="A4A3A4"/>
+          </p15:clr>
+        </p15:guide>
+        <p15:guide id="2" pos="2116">
+          <p15:clr>
+            <a:srgbClr val="A4A3A4"/>
+          </p15:clr>
+        </p15:guide>
+      </p15:notesGuideLst>
+    </p:ext>
   </p:extLst>
 </p:presentation>
 </file>
@@ -989,6 +1042,11 @@
         </p:txBody>
       </p:sp>
     </p:spTree>
+    <p:extLst>
+      <p:ext uri="{BB962C8B-B14F-4D97-AF65-F5344CB8AC3E}">
+        <p14:creationId xmlns:p14="http://schemas.microsoft.com/office/powerpoint/2010/main" val="588866779"/>
+      </p:ext>
+    </p:extLst>
   </p:cSld>
   <p:clrMapOvr>
     <a:masterClrMapping/>
@@ -1071,6 +1129,11 @@
         </p:txBody>
       </p:sp>
     </p:spTree>
+    <p:extLst>
+      <p:ext uri="{BB962C8B-B14F-4D97-AF65-F5344CB8AC3E}">
+        <p14:creationId xmlns:p14="http://schemas.microsoft.com/office/powerpoint/2010/main" val="2633618201"/>
+      </p:ext>
+    </p:extLst>
   </p:cSld>
   <p:clrMapOvr>
     <a:masterClrMapping/>
@@ -1153,6 +1216,11 @@
         </p:txBody>
       </p:sp>
     </p:spTree>
+    <p:extLst>
+      <p:ext uri="{BB962C8B-B14F-4D97-AF65-F5344CB8AC3E}">
+        <p14:creationId xmlns:p14="http://schemas.microsoft.com/office/powerpoint/2010/main" val="1114623959"/>
+      </p:ext>
+    </p:extLst>
   </p:cSld>
   <p:clrMapOvr>
     <a:masterClrMapping/>
@@ -1252,7 +1320,7 @@
           <a:p>
             <a:fld id="{A9A69B4D-59F3-4685-80DB-21A7405CC474}" type="datetime1">
               <a:rPr lang="de-DE" smtClean="0"/>
-              <a:t>17.05.2013</a:t>
+              <a:t>29.09.2015</a:t>
             </a:fld>
             <a:endParaRPr lang="de-DE" dirty="0"/>
           </a:p>
@@ -2585,7 +2653,7 @@
           <a:p>
             <a:fld id="{F952188C-EBCA-4D72-937B-CA4757EA6AAE}" type="datetime1">
               <a:rPr lang="de-DE" smtClean="0"/>
-              <a:t>17.05.2013</a:t>
+              <a:t>29.09.2015</a:t>
             </a:fld>
             <a:endParaRPr lang="de-DE" dirty="0"/>
           </a:p>
@@ -2782,7 +2850,7 @@
           <a:p>
             <a:fld id="{384E3EA2-7308-44C6-8772-FC663B756875}" type="datetime1">
               <a:rPr lang="de-DE" smtClean="0"/>
-              <a:t>17.05.2013</a:t>
+              <a:t>29.09.2015</a:t>
             </a:fld>
             <a:endParaRPr lang="de-DE" dirty="0"/>
           </a:p>
@@ -3724,7 +3792,7 @@
           <a:p>
             <a:fld id="{F76A15A3-68D8-41AF-8B47-D9651D8EA3AA}" type="datetime1">
               <a:rPr lang="de-DE" smtClean="0"/>
-              <a:t>17.05.2013</a:t>
+              <a:t>29.09.2015</a:t>
             </a:fld>
             <a:endParaRPr lang="de-DE" dirty="0"/>
           </a:p>
@@ -3901,7 +3969,7 @@
           <a:p>
             <a:fld id="{6CF59BC6-DC10-477A-A04D-9BAA99F49B8B}" type="datetime1">
               <a:rPr lang="de-DE" smtClean="0"/>
-              <a:t>17.05.2013</a:t>
+              <a:t>29.09.2015</a:t>
             </a:fld>
             <a:endParaRPr lang="de-DE" dirty="0"/>
           </a:p>
@@ -4106,7 +4174,7 @@
           <a:p>
             <a:fld id="{0055C5F6-2756-4509-8497-2CE83A7B4FD5}" type="datetime1">
               <a:rPr lang="de-DE" smtClean="0"/>
-              <a:t>17.05.2013</a:t>
+              <a:t>29.09.2015</a:t>
             </a:fld>
             <a:endParaRPr lang="de-DE" dirty="0"/>
           </a:p>
@@ -4278,7 +4346,7 @@
           <a:p>
             <a:fld id="{2AC1F88E-FC1E-4ED7-AFB2-FE76D16796DD}" type="datetime1">
               <a:rPr lang="de-DE" smtClean="0"/>
-              <a:t>17.05.2013</a:t>
+              <a:t>29.09.2015</a:t>
             </a:fld>
             <a:endParaRPr lang="de-DE" dirty="0"/>
           </a:p>
@@ -4499,7 +4567,7 @@
           <a:p>
             <a:fld id="{D9B6279E-53A7-4656-A7B5-9E7B07E8FB4E}" type="datetime1">
               <a:rPr lang="de-DE" smtClean="0"/>
-              <a:t>17.05.2013</a:t>
+              <a:t>29.09.2015</a:t>
             </a:fld>
             <a:endParaRPr lang="de-DE" dirty="0"/>
           </a:p>
@@ -4697,7 +4765,7 @@
           <a:p>
             <a:fld id="{0D46D78C-2856-4360-9378-5B7FEF775369}" type="datetime1">
               <a:rPr lang="de-DE" smtClean="0"/>
-              <a:t>17.05.2013</a:t>
+              <a:t>29.09.2015</a:t>
             </a:fld>
             <a:endParaRPr lang="de-DE" dirty="0"/>
           </a:p>
@@ -5964,7 +6032,7 @@
           <a:p>
             <a:fld id="{F66E7E07-E70F-4035-B745-10D58F9E4EE1}" type="datetime1">
               <a:rPr lang="de-DE" smtClean="0"/>
-              <a:t>17.05.2013</a:t>
+              <a:t>29.09.2015</a:t>
             </a:fld>
             <a:endParaRPr lang="de-DE" dirty="0"/>
           </a:p>
@@ -6952,7 +7020,7 @@
           <a:p>
             <a:fld id="{EB6BB14C-1D29-49F4-A361-4DFE3CDB639E}" type="datetime1">
               <a:rPr lang="de-DE" smtClean="0"/>
-              <a:t>17.05.2013</a:t>
+              <a:t>29.09.2015</a:t>
             </a:fld>
             <a:endParaRPr lang="de-DE" dirty="0"/>
           </a:p>
@@ -7523,7 +7591,7 @@
           <a:p>
             <a:fld id="{D9400105-BE21-46EA-969D-5905279EBF9A}" type="datetime1">
               <a:rPr lang="de-DE" smtClean="0"/>
-              <a:t>17.05.2013</a:t>
+              <a:t>29.09.2015</a:t>
             </a:fld>
             <a:endParaRPr lang="de-DE" dirty="0"/>
           </a:p>
@@ -9014,7 +9082,7 @@
           <a:p>
             <a:fld id="{B36B3D74-888B-4579-8ECA-F79ED67C9FED}" type="datetime1">
               <a:rPr lang="de-DE" smtClean="0"/>
-              <a:t>17.05.2013</a:t>
+              <a:t>29.09.2015</a:t>
             </a:fld>
             <a:endParaRPr lang="de-DE" dirty="0"/>
           </a:p>
@@ -10770,7 +10838,7 @@
           <a:p>
             <a:fld id="{CCA4CB57-E79D-442B-B4A3-2B58392E5AB2}" type="datetime1">
               <a:rPr lang="de-DE" smtClean="0"/>
-              <a:t>17.05.2013</a:t>
+              <a:t>29.09.2015</a:t>
             </a:fld>
             <a:endParaRPr lang="de-DE" dirty="0"/>
           </a:p>
@@ -10856,7 +10924,7 @@
           <a:p>
             <a:fld id="{9813B57C-2DE6-414E-8D11-766986C9CA20}" type="datetime1">
               <a:rPr lang="de-DE" smtClean="0"/>
-              <a:t>17.05.2013</a:t>
+              <a:t>29.09.2015</a:t>
             </a:fld>
             <a:endParaRPr lang="de-DE" dirty="0"/>
           </a:p>
@@ -10974,7 +11042,7 @@
           <a:p>
             <a:fld id="{5F5C0FB0-339F-40BE-880C-9EA7459F27BC}" type="datetime1">
               <a:rPr lang="de-DE" smtClean="0"/>
-              <a:t>17.05.2013</a:t>
+              <a:t>29.09.2015</a:t>
             </a:fld>
             <a:endParaRPr lang="de-DE" dirty="0"/>
           </a:p>
@@ -12435,7 +12503,7 @@
           <a:p>
             <a:fld id="{C96F69F2-750A-429E-ABBF-76BA201674AD}" type="datetime1">
               <a:rPr lang="de-DE" smtClean="0"/>
-              <a:t>17.05.2013</a:t>
+              <a:t>29.09.2015</a:t>
             </a:fld>
             <a:endParaRPr lang="de-DE" dirty="0"/>
           </a:p>
@@ -12946,7 +13014,7 @@
           <a:p>
             <a:fld id="{68987C90-B923-4191-B0D9-0568E390164D}" type="datetime1">
               <a:rPr lang="de-DE" smtClean="0"/>
-              <a:t>17.05.2013</a:t>
+              <a:t>29.09.2015</a:t>
             </a:fld>
             <a:endParaRPr lang="de-DE" dirty="0"/>
           </a:p>
@@ -14796,7 +14864,7 @@
           <a:p>
             <a:fld id="{E1EC32EC-6798-4261-9F39-1F10CA615DFD}" type="datetime1">
               <a:rPr lang="de-DE" smtClean="0"/>
-              <a:t>17.05.2013</a:t>
+              <a:t>29.09.2015</a:t>
             </a:fld>
             <a:endParaRPr lang="de-DE" dirty="0"/>
           </a:p>
@@ -15042,7 +15110,7 @@
           <a:p>
             <a:fld id="{4529B754-6C8F-4348-91D2-15F67ED7C4CB}" type="datetime1">
               <a:rPr lang="de-DE" smtClean="0"/>
-              <a:t>17.05.2013</a:t>
+              <a:t>29.09.2015</a:t>
             </a:fld>
             <a:endParaRPr lang="de-DE" dirty="0"/>
           </a:p>
@@ -15156,7 +15224,7 @@
           <a:p>
             <a:fld id="{E4C96B47-D7B5-4409-80EB-8AA6453332F6}" type="datetime1">
               <a:rPr lang="de-DE" smtClean="0"/>
-              <a:t>17.05.2013</a:t>
+              <a:t>29.09.2015</a:t>
             </a:fld>
             <a:endParaRPr lang="de-DE" dirty="0"/>
           </a:p>
@@ -15274,7 +15342,7 @@
           <a:p>
             <a:fld id="{4A971074-7BEB-4DE3-A886-31C6D1C9479E}" type="datetime1">
               <a:rPr lang="de-DE" smtClean="0"/>
-              <a:t>17.05.2013</a:t>
+              <a:t>29.09.2015</a:t>
             </a:fld>
             <a:endParaRPr lang="de-DE" dirty="0"/>
           </a:p>
@@ -16629,7 +16697,7 @@
           <a:p>
             <a:fld id="{17BB9D9A-B13E-4F41-9F92-1893A8107F79}" type="datetime1">
               <a:rPr lang="de-DE" smtClean="0"/>
-              <a:t>17.05.2013</a:t>
+              <a:t>29.09.2015</a:t>
             </a:fld>
             <a:endParaRPr lang="de-DE" dirty="0"/>
           </a:p>
@@ -17444,7 +17512,7 @@
           <a:p>
             <a:fld id="{FA1F0271-FCD7-4109-BE3D-9D2DAC73F2CD}" type="datetime1">
               <a:rPr lang="de-DE" smtClean="0"/>
-              <a:t>17.05.2013</a:t>
+              <a:t>29.09.2015</a:t>
             </a:fld>
             <a:endParaRPr lang="de-DE" dirty="0"/>
           </a:p>
@@ -17671,7 +17739,7 @@
           <a:p>
             <a:fld id="{8033201C-D849-4CE0-BD96-63A63FFE0823}" type="datetime1">
               <a:rPr lang="de-DE" smtClean="0"/>
-              <a:t>17.05.2013</a:t>
+              <a:t>29.09.2015</a:t>
             </a:fld>
             <a:endParaRPr lang="de-DE" dirty="0"/>
           </a:p>
@@ -18524,7 +18592,7 @@
           <a:p>
             <a:fld id="{E16227B1-C789-406C-91A6-49BE17F0B9D5}" type="datetime1">
               <a:rPr lang="de-DE" smtClean="0"/>
-              <a:t>17.05.2013</a:t>
+              <a:t>29.09.2015</a:t>
             </a:fld>
             <a:endParaRPr lang="de-DE" dirty="0"/>
           </a:p>
@@ -19353,7 +19421,7 @@
           <a:p>
             <a:fld id="{54C32C53-F044-456F-B098-438808C47C81}" type="datetime1">
               <a:rPr lang="de-DE" smtClean="0"/>
-              <a:t>17.05.2013</a:t>
+              <a:t>29.09.2015</a:t>
             </a:fld>
             <a:endParaRPr lang="de-DE" dirty="0"/>
           </a:p>
@@ -20283,7 +20351,7 @@
           <a:p>
             <a:fld id="{823718DD-6E1E-4F1C-9BE7-F5F53EC80F97}" type="datetime1">
               <a:rPr lang="de-DE" smtClean="0"/>
-              <a:t>17.05.2013</a:t>
+              <a:t>29.09.2015</a:t>
             </a:fld>
             <a:endParaRPr lang="de-DE" dirty="0"/>
           </a:p>
@@ -20462,7 +20530,19 @@
             </a:r>
             <a:r>
               <a:rPr lang="de-DE" dirty="0"/>
-              <a:t> und CVS als KM-Werkzeug gewährleistet</a:t>
+              <a:t> und </a:t>
+            </a:r>
+            <a:r>
+              <a:rPr lang="de-DE" dirty="0" smtClean="0"/>
+              <a:t>eines Versionskontrollsystems wie GIT, </a:t>
+            </a:r>
+            <a:r>
+              <a:rPr lang="de-DE" smtClean="0"/>
+              <a:t>SVN oder CVS </a:t>
+            </a:r>
+            <a:r>
+              <a:rPr lang="de-DE" dirty="0"/>
+              <a:t>gewährleistet</a:t>
             </a:r>
             <a:r>
               <a:rPr lang="de-DE" dirty="0" smtClean="0"/>
@@ -20504,7 +20584,7 @@
           <a:p>
             <a:fld id="{7263D893-EFD3-4F2C-9670-2F3C3097F8D3}" type="datetime1">
               <a:rPr lang="de-DE" smtClean="0"/>
-              <a:t>17.05.2013</a:t>
+              <a:t>29.09.2015</a:t>
             </a:fld>
             <a:endParaRPr lang="de-DE" dirty="0"/>
           </a:p>
@@ -22324,7 +22404,7 @@
           <a:p>
             <a:fld id="{237DD65C-2085-4AC0-9278-7C919D64BFA2}" type="datetime1">
               <a:rPr lang="de-DE" smtClean="0"/>
-              <a:t>17.05.2013</a:t>
+              <a:t>29.09.2015</a:t>
             </a:fld>
             <a:endParaRPr lang="de-DE" dirty="0"/>
           </a:p>
@@ -24367,7 +24447,7 @@
           <a:p>
             <a:fld id="{D5652802-49E7-4967-8395-501233EBD476}" type="datetime1">
               <a:rPr lang="de-DE" smtClean="0"/>
-              <a:t>17.05.2013</a:t>
+              <a:t>29.09.2015</a:t>
             </a:fld>
             <a:endParaRPr lang="de-DE" dirty="0"/>
           </a:p>
@@ -24526,7 +24606,7 @@
           <a:p>
             <a:fld id="{33690158-2B12-4CC9-AAD4-24DD5053DF58}" type="datetime1">
               <a:rPr lang="de-DE" smtClean="0"/>
-              <a:t>17.05.2013</a:t>
+              <a:t>29.09.2015</a:t>
             </a:fld>
             <a:endParaRPr lang="de-DE" dirty="0"/>
           </a:p>
@@ -24644,7 +24724,7 @@
           <a:p>
             <a:fld id="{7C2A4CE9-7791-47B0-9846-3C9F3E1A063A}" type="datetime1">
               <a:rPr lang="de-DE" smtClean="0"/>
-              <a:t>17.05.2013</a:t>
+              <a:t>29.09.2015</a:t>
             </a:fld>
             <a:endParaRPr lang="de-DE" dirty="0"/>
           </a:p>
@@ -26079,7 +26159,7 @@
           <a:p>
             <a:fld id="{0BCA1907-1B92-4086-A66F-C28B40A92E30}" type="datetime1">
               <a:rPr lang="de-DE" smtClean="0"/>
-              <a:t>17.05.2013</a:t>
+              <a:t>29.09.2015</a:t>
             </a:fld>
             <a:endParaRPr lang="de-DE" dirty="0"/>
           </a:p>
@@ -27618,7 +27698,7 @@
           <a:p>
             <a:fld id="{85F3A94C-995C-45AE-A346-609B595FC8F8}" type="datetime1">
               <a:rPr lang="de-DE" smtClean="0"/>
-              <a:t>17.05.2013</a:t>
+              <a:t>29.09.2015</a:t>
             </a:fld>
             <a:endParaRPr lang="de-DE" dirty="0"/>
           </a:p>
@@ -28984,7 +29064,7 @@
           <a:p>
             <a:fld id="{D28729F1-0C7C-445A-96B0-F0B4CA84AA04}" type="datetime1">
               <a:rPr lang="de-DE" smtClean="0"/>
-              <a:t>17.05.2013</a:t>
+              <a:t>29.09.2015</a:t>
             </a:fld>
             <a:endParaRPr lang="de-DE" dirty="0"/>
           </a:p>
@@ -30953,7 +31033,7 @@
           <a:p>
             <a:fld id="{323E3525-FFBB-4874-957A-FF8E287515E5}" type="datetime1">
               <a:rPr lang="de-DE" smtClean="0"/>
-              <a:t>17.05.2013</a:t>
+              <a:t>29.09.2015</a:t>
             </a:fld>
             <a:endParaRPr lang="de-DE" dirty="0"/>
           </a:p>
@@ -31212,7 +31292,7 @@
           <a:p>
             <a:fld id="{D8F6D534-1AB6-42A3-9B02-3A9CBF1D4773}" type="datetime1">
               <a:rPr lang="de-DE" smtClean="0"/>
-              <a:t>17.05.2013</a:t>
+              <a:t>29.09.2015</a:t>
             </a:fld>
             <a:endParaRPr lang="de-DE" dirty="0"/>
           </a:p>
@@ -31326,7 +31406,7 @@
           <a:p>
             <a:fld id="{CA1337F5-84F1-4ED4-BFAA-1B2DE980E53C}" type="datetime1">
               <a:rPr lang="de-DE" smtClean="0"/>
-              <a:t>17.05.2013</a:t>
+              <a:t>29.09.2015</a:t>
             </a:fld>
             <a:endParaRPr lang="de-DE" dirty="0"/>
           </a:p>
@@ -31444,7 +31524,7 @@
           <a:p>
             <a:fld id="{E3D384F5-27EE-4D4F-B33B-A45D12B9A2D9}" type="datetime1">
               <a:rPr lang="de-DE" smtClean="0"/>
-              <a:t>17.05.2013</a:t>
+              <a:t>29.09.2015</a:t>
             </a:fld>
             <a:endParaRPr lang="de-DE" dirty="0"/>
           </a:p>
@@ -32733,7 +32813,7 @@
           <a:p>
             <a:fld id="{CDE83168-DACE-49D4-BBFA-A5E200368A63}" type="datetime1">
               <a:rPr lang="de-DE" smtClean="0"/>
-              <a:t>17.05.2013</a:t>
+              <a:t>29.09.2015</a:t>
             </a:fld>
             <a:endParaRPr lang="de-DE" dirty="0"/>
           </a:p>
@@ -32840,7 +32920,7 @@
           <a:p>
             <a:fld id="{C97DC1A3-9196-4992-A528-4098D816F7DC}" type="datetime1">
               <a:rPr lang="de-DE" smtClean="0"/>
-              <a:t>17.05.2013</a:t>
+              <a:t>29.09.2015</a:t>
             </a:fld>
             <a:endParaRPr lang="de-DE" dirty="0"/>
           </a:p>
@@ -33128,7 +33208,7 @@
           <a:p>
             <a:fld id="{3660FDF8-55CD-48E8-84AE-7FE249D0C181}" type="datetime1">
               <a:rPr lang="de-DE" smtClean="0"/>
-              <a:t>17.05.2013</a:t>
+              <a:t>29.09.2015</a:t>
             </a:fld>
             <a:endParaRPr lang="de-DE" dirty="0"/>
           </a:p>
@@ -33242,7 +33322,7 @@
           <a:p>
             <a:fld id="{70C6534D-5BA8-4A0F-B024-A0E05CBCA114}" type="datetime1">
               <a:rPr lang="de-DE" smtClean="0"/>
-              <a:t>17.05.2013</a:t>
+              <a:t>29.09.2015</a:t>
             </a:fld>
             <a:endParaRPr lang="de-DE" dirty="0"/>
           </a:p>
@@ -33360,7 +33440,7 @@
           <a:p>
             <a:fld id="{CDF3D59D-23D3-4454-99A5-E4948CEC8A1D}" type="datetime1">
               <a:rPr lang="de-DE" smtClean="0"/>
-              <a:t>17.05.2013</a:t>
+              <a:t>29.09.2015</a:t>
             </a:fld>
             <a:endParaRPr lang="de-DE" dirty="0"/>
           </a:p>
@@ -36067,7 +36147,7 @@
           <a:p>
             <a:fld id="{31C207BA-F90D-4F81-A0C1-4401488FFC46}" type="datetime1">
               <a:rPr lang="de-DE" smtClean="0"/>
-              <a:t>17.05.2013</a:t>
+              <a:t>29.09.2015</a:t>
             </a:fld>
             <a:endParaRPr lang="de-DE" dirty="0"/>
           </a:p>
@@ -38491,7 +38571,7 @@
           <a:p>
             <a:fld id="{C98A80CF-9460-4B5F-B0DA-7A8B739753CF}" type="datetime1">
               <a:rPr lang="de-DE" smtClean="0"/>
-              <a:t>17.05.2013</a:t>
+              <a:t>29.09.2015</a:t>
             </a:fld>
             <a:endParaRPr lang="de-DE" dirty="0"/>
           </a:p>
@@ -38687,7 +38767,7 @@
           <a:p>
             <a:fld id="{28240372-C596-4DC1-8B18-DD426E74B0A3}" type="datetime1">
               <a:rPr lang="de-DE" smtClean="0"/>
-              <a:t>17.05.2013</a:t>
+              <a:t>29.09.2015</a:t>
             </a:fld>
             <a:endParaRPr lang="de-DE" dirty="0"/>
           </a:p>

</xml_diff>